<commit_message>
update help  in readme.txt
</commit_message>
<xml_diff>
--- a/rtmsim_help.pptx
+++ b/rtmsim_help.pptx
@@ -259,7 +259,7 @@
           <a:p>
             <a:fld id="{0B8ED5A3-26CD-46D7-B8E6-8D3B9B183D2C}" type="datetimeFigureOut">
               <a:rPr lang="de-DE" smtClean="0"/>
-              <a:t>31.03.2022</a:t>
+              <a:t>07.04.2022</a:t>
             </a:fld>
             <a:endParaRPr lang="de-DE"/>
           </a:p>
@@ -457,7 +457,7 @@
           <a:p>
             <a:fld id="{0B8ED5A3-26CD-46D7-B8E6-8D3B9B183D2C}" type="datetimeFigureOut">
               <a:rPr lang="de-DE" smtClean="0"/>
-              <a:t>31.03.2022</a:t>
+              <a:t>07.04.2022</a:t>
             </a:fld>
             <a:endParaRPr lang="de-DE"/>
           </a:p>
@@ -665,7 +665,7 @@
           <a:p>
             <a:fld id="{0B8ED5A3-26CD-46D7-B8E6-8D3B9B183D2C}" type="datetimeFigureOut">
               <a:rPr lang="de-DE" smtClean="0"/>
-              <a:t>31.03.2022</a:t>
+              <a:t>07.04.2022</a:t>
             </a:fld>
             <a:endParaRPr lang="de-DE"/>
           </a:p>
@@ -863,7 +863,7 @@
           <a:p>
             <a:fld id="{0B8ED5A3-26CD-46D7-B8E6-8D3B9B183D2C}" type="datetimeFigureOut">
               <a:rPr lang="de-DE" smtClean="0"/>
-              <a:t>31.03.2022</a:t>
+              <a:t>07.04.2022</a:t>
             </a:fld>
             <a:endParaRPr lang="de-DE"/>
           </a:p>
@@ -1138,7 +1138,7 @@
           <a:p>
             <a:fld id="{0B8ED5A3-26CD-46D7-B8E6-8D3B9B183D2C}" type="datetimeFigureOut">
               <a:rPr lang="de-DE" smtClean="0"/>
-              <a:t>31.03.2022</a:t>
+              <a:t>07.04.2022</a:t>
             </a:fld>
             <a:endParaRPr lang="de-DE"/>
           </a:p>
@@ -1403,7 +1403,7 @@
           <a:p>
             <a:fld id="{0B8ED5A3-26CD-46D7-B8E6-8D3B9B183D2C}" type="datetimeFigureOut">
               <a:rPr lang="de-DE" smtClean="0"/>
-              <a:t>31.03.2022</a:t>
+              <a:t>07.04.2022</a:t>
             </a:fld>
             <a:endParaRPr lang="de-DE"/>
           </a:p>
@@ -1815,7 +1815,7 @@
           <a:p>
             <a:fld id="{0B8ED5A3-26CD-46D7-B8E6-8D3B9B183D2C}" type="datetimeFigureOut">
               <a:rPr lang="de-DE" smtClean="0"/>
-              <a:t>31.03.2022</a:t>
+              <a:t>07.04.2022</a:t>
             </a:fld>
             <a:endParaRPr lang="de-DE"/>
           </a:p>
@@ -1956,7 +1956,7 @@
           <a:p>
             <a:fld id="{0B8ED5A3-26CD-46D7-B8E6-8D3B9B183D2C}" type="datetimeFigureOut">
               <a:rPr lang="de-DE" smtClean="0"/>
-              <a:t>31.03.2022</a:t>
+              <a:t>07.04.2022</a:t>
             </a:fld>
             <a:endParaRPr lang="de-DE"/>
           </a:p>
@@ -2069,7 +2069,7 @@
           <a:p>
             <a:fld id="{0B8ED5A3-26CD-46D7-B8E6-8D3B9B183D2C}" type="datetimeFigureOut">
               <a:rPr lang="de-DE" smtClean="0"/>
-              <a:t>31.03.2022</a:t>
+              <a:t>07.04.2022</a:t>
             </a:fld>
             <a:endParaRPr lang="de-DE"/>
           </a:p>
@@ -2380,7 +2380,7 @@
           <a:p>
             <a:fld id="{0B8ED5A3-26CD-46D7-B8E6-8D3B9B183D2C}" type="datetimeFigureOut">
               <a:rPr lang="de-DE" smtClean="0"/>
-              <a:t>31.03.2022</a:t>
+              <a:t>07.04.2022</a:t>
             </a:fld>
             <a:endParaRPr lang="de-DE"/>
           </a:p>
@@ -2668,7 +2668,7 @@
           <a:p>
             <a:fld id="{0B8ED5A3-26CD-46D7-B8E6-8D3B9B183D2C}" type="datetimeFigureOut">
               <a:rPr lang="de-DE" smtClean="0"/>
-              <a:t>31.03.2022</a:t>
+              <a:t>07.04.2022</a:t>
             </a:fld>
             <a:endParaRPr lang="de-DE"/>
           </a:p>
@@ -2909,7 +2909,7 @@
           <a:p>
             <a:fld id="{0B8ED5A3-26CD-46D7-B8E6-8D3B9B183D2C}" type="datetimeFigureOut">
               <a:rPr lang="de-DE" smtClean="0"/>
-              <a:t>31.03.2022</a:t>
+              <a:t>07.04.2022</a:t>
             </a:fld>
             <a:endParaRPr lang="de-DE"/>
           </a:p>
@@ -3892,7 +3892,7 @@
         <p:spPr>
           <a:xfrm>
             <a:off x="8908929" y="5116513"/>
-            <a:ext cx="1322773" cy="338554"/>
+            <a:ext cx="1960239" cy="338554"/>
           </a:xfrm>
           <a:prstGeom prst="rect">
             <a:avLst/>
@@ -3948,6 +3948,28 @@
             <a:r>
               <a:rPr lang="de-DE" sz="800" dirty="0" err="1"/>
               <a:t>direction</a:t>
+            </a:r>
+            <a:r>
+              <a:rPr lang="de-DE" sz="800" dirty="0"/>
+              <a:t>, i.e. </a:t>
+            </a:r>
+            <a:r>
+              <a:rPr lang="de-DE" sz="800" dirty="0" err="1"/>
+              <a:t>alpha</a:t>
+            </a:r>
+            <a:r>
+              <a:rPr lang="de-DE" sz="800" dirty="0"/>
+              <a:t> </a:t>
+            </a:r>
+            <a:r>
+              <a:rPr lang="de-DE" sz="800" dirty="0">
+                <a:sym typeface="Symbol" panose="05050102010706020507" pitchFamily="18" charset="2"/>
+              </a:rPr>
+              <a:t> </a:t>
+            </a:r>
+            <a:r>
+              <a:rPr lang="de-DE" sz="800" dirty="0" err="1"/>
+              <a:t>permeability</a:t>
             </a:r>
             <a:endParaRPr lang="de-DE" sz="800" dirty="0"/>
           </a:p>
@@ -4792,6 +4814,150 @@
               <a:t>name</a:t>
             </a:r>
             <a:endParaRPr lang="de-DE" sz="800" dirty="0"/>
+          </a:p>
+        </p:txBody>
+      </p:sp>
+      <p:sp>
+        <p:nvSpPr>
+          <p:cNvPr id="31" name="Textfeld 30">
+            <a:extLst>
+              <a:ext uri="{FF2B5EF4-FFF2-40B4-BE49-F238E27FC236}">
+                <a16:creationId xmlns:a16="http://schemas.microsoft.com/office/drawing/2014/main" id="{CF3B66B9-0166-4935-A256-1D52F91FC38E}"/>
+              </a:ext>
+            </a:extLst>
+          </p:cNvPr>
+          <p:cNvSpPr txBox="1"/>
+          <p:nvPr/>
+        </p:nvSpPr>
+        <p:spPr>
+          <a:xfrm>
+            <a:off x="8908927" y="3407076"/>
+            <a:ext cx="1322773" cy="215444"/>
+          </a:xfrm>
+          <a:prstGeom prst="rect">
+            <a:avLst/>
+          </a:prstGeom>
+          <a:noFill/>
+        </p:spPr>
+        <p:txBody>
+          <a:bodyPr wrap="square" rtlCol="0">
+            <a:spAutoFit/>
+          </a:bodyPr>
+          <a:lstStyle/>
+          <a:p>
+            <a:r>
+              <a:rPr lang="de-DE" sz="800" dirty="0" err="1"/>
+              <a:t>patch</a:t>
+            </a:r>
+            <a:r>
+              <a:rPr lang="de-DE" sz="800" dirty="0"/>
+              <a:t> type = 0</a:t>
+            </a:r>
+          </a:p>
+        </p:txBody>
+      </p:sp>
+      <p:sp>
+        <p:nvSpPr>
+          <p:cNvPr id="32" name="Textfeld 31">
+            <a:extLst>
+              <a:ext uri="{FF2B5EF4-FFF2-40B4-BE49-F238E27FC236}">
+                <a16:creationId xmlns:a16="http://schemas.microsoft.com/office/drawing/2014/main" id="{16ED5887-1411-4ED9-A4AF-99E3E31D5912}"/>
+              </a:ext>
+            </a:extLst>
+          </p:cNvPr>
+          <p:cNvSpPr txBox="1"/>
+          <p:nvPr/>
+        </p:nvSpPr>
+        <p:spPr>
+          <a:xfrm>
+            <a:off x="8908926" y="3600487"/>
+            <a:ext cx="1322773" cy="215444"/>
+          </a:xfrm>
+          <a:prstGeom prst="rect">
+            <a:avLst/>
+          </a:prstGeom>
+          <a:noFill/>
+        </p:spPr>
+        <p:txBody>
+          <a:bodyPr wrap="square" rtlCol="0">
+            <a:spAutoFit/>
+          </a:bodyPr>
+          <a:lstStyle/>
+          <a:p>
+            <a:r>
+              <a:rPr lang="de-DE" sz="800" dirty="0"/>
+              <a:t>                     = 1</a:t>
+            </a:r>
+          </a:p>
+        </p:txBody>
+      </p:sp>
+      <p:sp>
+        <p:nvSpPr>
+          <p:cNvPr id="33" name="Textfeld 32">
+            <a:extLst>
+              <a:ext uri="{FF2B5EF4-FFF2-40B4-BE49-F238E27FC236}">
+                <a16:creationId xmlns:a16="http://schemas.microsoft.com/office/drawing/2014/main" id="{E2CED7B1-74B3-4B79-879E-887A8E2C544D}"/>
+              </a:ext>
+            </a:extLst>
+          </p:cNvPr>
+          <p:cNvSpPr txBox="1"/>
+          <p:nvPr/>
+        </p:nvSpPr>
+        <p:spPr>
+          <a:xfrm>
+            <a:off x="8908925" y="3782510"/>
+            <a:ext cx="1322773" cy="215444"/>
+          </a:xfrm>
+          <a:prstGeom prst="rect">
+            <a:avLst/>
+          </a:prstGeom>
+          <a:noFill/>
+        </p:spPr>
+        <p:txBody>
+          <a:bodyPr wrap="square" rtlCol="0">
+            <a:spAutoFit/>
+          </a:bodyPr>
+          <a:lstStyle/>
+          <a:p>
+            <a:r>
+              <a:rPr lang="de-DE" sz="800" dirty="0"/>
+              <a:t>                     = 3</a:t>
+            </a:r>
+          </a:p>
+        </p:txBody>
+      </p:sp>
+      <p:sp>
+        <p:nvSpPr>
+          <p:cNvPr id="34" name="Textfeld 33">
+            <a:extLst>
+              <a:ext uri="{FF2B5EF4-FFF2-40B4-BE49-F238E27FC236}">
+                <a16:creationId xmlns:a16="http://schemas.microsoft.com/office/drawing/2014/main" id="{D9FAC841-6037-4852-AE1C-B93159E8F7BC}"/>
+              </a:ext>
+            </a:extLst>
+          </p:cNvPr>
+          <p:cNvSpPr txBox="1"/>
+          <p:nvPr/>
+        </p:nvSpPr>
+        <p:spPr>
+          <a:xfrm>
+            <a:off x="8908925" y="3969026"/>
+            <a:ext cx="1322773" cy="215444"/>
+          </a:xfrm>
+          <a:prstGeom prst="rect">
+            <a:avLst/>
+          </a:prstGeom>
+          <a:noFill/>
+        </p:spPr>
+        <p:txBody>
+          <a:bodyPr wrap="square" rtlCol="0">
+            <a:spAutoFit/>
+          </a:bodyPr>
+          <a:lstStyle/>
+          <a:p>
+            <a:r>
+              <a:rPr lang="de-DE" sz="800" dirty="0"/>
+              <a:t>                     = 2</a:t>
+            </a:r>
           </a:p>
         </p:txBody>
       </p:sp>

</xml_diff>